<commit_message>
Add updated PPT, new documentation, and notebook files
</commit_message>
<xml_diff>
--- a/Documentation/PPT1.pptx
+++ b/Documentation/PPT1.pptx
@@ -10950,31 +10950,41 @@
           </a:p>
         </p:txBody>
       </p:sp>
-      <p:sp>
-        <p:nvSpPr>
-          <p:cNvPr id="3" name="Content Placeholder 2">
-            <a:extLst>
-              <a:ext uri="{FF2B5EF4-FFF2-40B4-BE49-F238E27FC236}">
-                <a16:creationId xmlns:a16="http://schemas.microsoft.com/office/drawing/2014/main" id="{46816309-5C23-6D1F-DC6F-B6E2618119AC}"/>
-              </a:ext>
-            </a:extLst>
-          </p:cNvPr>
-          <p:cNvSpPr>
-            <a:spLocks noGrp="1"/>
-          </p:cNvSpPr>
+      <p:pic>
+        <p:nvPicPr>
+          <p:cNvPr id="5" name="Content Placeholder 4" descr="A diagram of a procedure">
+            <a:extLst>
+              <a:ext uri="{FF2B5EF4-FFF2-40B4-BE49-F238E27FC236}">
+                <a16:creationId xmlns:a16="http://schemas.microsoft.com/office/drawing/2014/main" id="{A037DBA6-C6FA-51C7-4CA7-1F17239F4234}"/>
+              </a:ext>
+            </a:extLst>
+          </p:cNvPr>
+          <p:cNvPicPr>
+            <a:picLocks noGrp="1" noChangeAspect="1"/>
+          </p:cNvPicPr>
           <p:nvPr>
             <p:ph idx="1"/>
           </p:nvPr>
-        </p:nvSpPr>
-        <p:spPr/>
-        <p:txBody>
-          <a:bodyPr/>
-          <a:lstStyle/>
-          <a:p>
-            <a:endParaRPr lang="en-IN" dirty="0"/>
-          </a:p>
-        </p:txBody>
-      </p:sp>
+        </p:nvPicPr>
+        <p:blipFill>
+          <a:blip r:embed="rId2">
+            <a:extLst>
+              <a:ext uri="{28A0092B-C50C-407E-A947-70E740481C1C}">
+                <a14:useLocalDpi xmlns:a14="http://schemas.microsoft.com/office/drawing/2010/main" val="0"/>
+              </a:ext>
+            </a:extLst>
+          </a:blip>
+          <a:stretch>
+            <a:fillRect/>
+          </a:stretch>
+        </p:blipFill>
+        <p:spPr>
+          <a:xfrm>
+            <a:off x="2707768" y="2112962"/>
+            <a:ext cx="5134557" cy="4267903"/>
+          </a:xfrm>
+        </p:spPr>
+      </p:pic>
     </p:spTree>
     <p:extLst>
       <p:ext uri="{BB962C8B-B14F-4D97-AF65-F5344CB8AC3E}">
@@ -11060,7 +11070,15 @@
             </a:r>
             <a:r>
               <a:rPr lang="en-US" dirty="0"/>
-              <a:t>Using CNN models to classify waste into categories like plastic, paper, and metal.</a:t>
+              <a:t>Using CNN,YOLO ,RANDOM </a:t>
+            </a:r>
+            <a:r>
+              <a:rPr lang="en-US"/>
+              <a:t>FOREST,ResNet50 </a:t>
+            </a:r>
+            <a:r>
+              <a:rPr lang="en-US" dirty="0"/>
+              <a:t>models to classify waste into categories like plastic, paper, and metal.</a:t>
             </a:r>
           </a:p>
           <a:p>

</xml_diff>